<commit_message>
modificação de arquivos e finalização da contextualização
</commit_message>
<xml_diff>
--- a/CONTROL BLOCK.pptx
+++ b/CONTROL BLOCK.pptx
@@ -6,10 +6,10 @@
   </p:sldMasterIdLst>
   <p:sldIdLst>
     <p:sldId id="256" r:id="rId2"/>
-    <p:sldId id="261" r:id="rId3"/>
-    <p:sldId id="257" r:id="rId4"/>
-    <p:sldId id="258" r:id="rId5"/>
-    <p:sldId id="259" r:id="rId6"/>
+    <p:sldId id="257" r:id="rId3"/>
+    <p:sldId id="258" r:id="rId4"/>
+    <p:sldId id="259" r:id="rId5"/>
+    <p:sldId id="261" r:id="rId6"/>
     <p:sldId id="260" r:id="rId7"/>
   </p:sldIdLst>
   <p:sldSz cx="12192000" cy="6858000"/>
@@ -5879,19 +5879,7 @@
               <a:rPr lang="pt-BR" sz="2400" b="1" dirty="0" smtClean="0">
                 <a:latin typeface="Century" panose="02040604050505020304" pitchFamily="18" charset="0"/>
               </a:rPr>
-              <a:t>seus </a:t>
-            </a:r>
-            <a:r>
-              <a:rPr lang="pt-BR" sz="2400" b="1" dirty="0" smtClean="0">
-                <a:latin typeface="Century" panose="02040604050505020304" pitchFamily="18" charset="0"/>
-              </a:rPr>
-              <a:t>proble</a:t>
-            </a:r>
-            <a:r>
-              <a:rPr lang="pt-BR" sz="2400" b="1" dirty="0" smtClean="0">
-                <a:latin typeface="Century" panose="02040604050505020304" pitchFamily="18" charset="0"/>
-              </a:rPr>
-              <a:t>mas</a:t>
+              <a:t>seus problemas</a:t>
             </a:r>
             <a:endParaRPr lang="en-US" sz="2400" b="1" dirty="0">
               <a:latin typeface="Century" panose="02040604050505020304" pitchFamily="18" charset="0"/>
@@ -5920,325 +5908,6 @@
 </file>
 
 <file path=ppt/slides/slide2.xml><?xml version="1.0" encoding="utf-8"?>
-<p:sld xmlns:a="http://schemas.openxmlformats.org/drawingml/2006/main" xmlns:r="http://schemas.openxmlformats.org/officeDocument/2006/relationships" xmlns:p="http://schemas.openxmlformats.org/presentationml/2006/main">
-  <p:cSld>
-    <p:spTree>
-      <p:nvGrpSpPr>
-        <p:cNvPr id="1" name=""/>
-        <p:cNvGrpSpPr/>
-        <p:nvPr/>
-      </p:nvGrpSpPr>
-      <p:grpSpPr>
-        <a:xfrm>
-          <a:off x="0" y="0"/>
-          <a:ext cx="0" cy="0"/>
-          <a:chOff x="0" y="0"/>
-          <a:chExt cx="0" cy="0"/>
-        </a:xfrm>
-      </p:grpSpPr>
-      <p:sp>
-        <p:nvSpPr>
-          <p:cNvPr id="2" name="Title 1">
-            <a:extLst>
-              <a:ext uri="{FF2B5EF4-FFF2-40B4-BE49-F238E27FC236}">
-                <a16:creationId xmlns:a16="http://schemas.microsoft.com/office/drawing/2014/main" id="{C6639D46-D84D-43E0-AA12-676C351F67E9}"/>
-              </a:ext>
-            </a:extLst>
-          </p:cNvPr>
-          <p:cNvSpPr>
-            <a:spLocks noGrp="1"/>
-          </p:cNvSpPr>
-          <p:nvPr>
-            <p:ph type="title"/>
-          </p:nvPr>
-        </p:nvSpPr>
-        <p:spPr/>
-        <p:txBody>
-          <a:bodyPr>
-            <a:normAutofit/>
-          </a:bodyPr>
-          <a:lstStyle/>
-          <a:p>
-            <a:r>
-              <a:rPr lang="pt-BR" sz="5400" b="1" dirty="0" err="1">
-                <a:effectLst>
-                  <a:outerShdw blurRad="38100" dist="38100" dir="2700000" algn="tl">
-                    <a:srgbClr val="000000">
-                      <a:alpha val="43137"/>
-                    </a:srgbClr>
-                  </a:outerShdw>
-                </a:effectLst>
-              </a:rPr>
-              <a:t>Control</a:t>
-            </a:r>
-            <a:r>
-              <a:rPr lang="pt-BR" sz="5400" b="1" dirty="0">
-                <a:effectLst>
-                  <a:outerShdw blurRad="38100" dist="38100" dir="2700000" algn="tl">
-                    <a:srgbClr val="000000">
-                      <a:alpha val="43137"/>
-                    </a:srgbClr>
-                  </a:outerShdw>
-                </a:effectLst>
-              </a:rPr>
-              <a:t> bus</a:t>
-            </a:r>
-            <a:endParaRPr lang="en-US" sz="5400" b="1" dirty="0">
-              <a:effectLst>
-                <a:outerShdw blurRad="38100" dist="38100" dir="2700000" algn="tl">
-                  <a:srgbClr val="000000">
-                    <a:alpha val="43137"/>
-                  </a:srgbClr>
-                </a:outerShdw>
-              </a:effectLst>
-            </a:endParaRPr>
-          </a:p>
-        </p:txBody>
-      </p:sp>
-      <p:sp>
-        <p:nvSpPr>
-          <p:cNvPr id="3" name="Content Placeholder 2">
-            <a:extLst>
-              <a:ext uri="{FF2B5EF4-FFF2-40B4-BE49-F238E27FC236}">
-                <a16:creationId xmlns:a16="http://schemas.microsoft.com/office/drawing/2014/main" id="{A6BA5222-70D2-405F-8531-1FFB3B11AF99}"/>
-              </a:ext>
-            </a:extLst>
-          </p:cNvPr>
-          <p:cNvSpPr>
-            <a:spLocks noGrp="1"/>
-          </p:cNvSpPr>
-          <p:nvPr>
-            <p:ph idx="1"/>
-          </p:nvPr>
-        </p:nvSpPr>
-        <p:spPr/>
-        <p:txBody>
-          <a:bodyPr/>
-          <a:lstStyle/>
-          <a:p>
-            <a:pPr marL="0" indent="0">
-              <a:buNone/>
-            </a:pPr>
-            <a:r>
-              <a:rPr lang="pt-BR" dirty="0"/>
-              <a:t>	Control Bus é um projeto que tem como objetivo trazer aos gestores do sistema de transposte público (SPTrans) e às empresas que prestam serviços de transporte coletivo, </a:t>
-            </a:r>
-            <a:r>
-              <a:rPr lang="pt-BR" dirty="0" smtClean="0"/>
-              <a:t>as </a:t>
-            </a:r>
-            <a:r>
-              <a:rPr lang="pt-BR" dirty="0"/>
-              <a:t>seguintes soluções</a:t>
-            </a:r>
-            <a:r>
-              <a:rPr lang="pt-BR" dirty="0" smtClean="0"/>
-              <a:t>:</a:t>
-            </a:r>
-          </a:p>
-          <a:p>
-            <a:pPr marL="0" indent="0">
-              <a:buNone/>
-            </a:pPr>
-            <a:endParaRPr lang="pt-BR" dirty="0"/>
-          </a:p>
-          <a:p>
-            <a:r>
-              <a:rPr lang="pt-BR" dirty="0" smtClean="0"/>
-              <a:t>Entender </a:t>
-            </a:r>
-            <a:r>
-              <a:rPr lang="pt-BR" dirty="0"/>
-              <a:t>sua real demanda em cada uma das linhas de </a:t>
-            </a:r>
-            <a:r>
-              <a:rPr lang="pt-BR" dirty="0" smtClean="0"/>
-              <a:t>ônibus oferecidas</a:t>
-            </a:r>
-            <a:r>
-              <a:rPr lang="pt-BR" dirty="0"/>
-              <a:t>;</a:t>
-            </a:r>
-          </a:p>
-          <a:p>
-            <a:r>
-              <a:rPr lang="pt-BR" dirty="0" smtClean="0"/>
-              <a:t>Contabilizar </a:t>
-            </a:r>
-            <a:r>
-              <a:rPr lang="pt-BR" dirty="0"/>
-              <a:t>de maneira automatizada o fluxo de passageiros, seja na entrada ou saída, </a:t>
-            </a:r>
-            <a:r>
-              <a:rPr lang="pt-BR" dirty="0" smtClean="0"/>
-              <a:t>e entender o comportamento dos usuários no </a:t>
-            </a:r>
-            <a:r>
-              <a:rPr lang="pt-BR" dirty="0"/>
-              <a:t>decorrer dos intinerarios dos </a:t>
-            </a:r>
-            <a:r>
-              <a:rPr lang="pt-BR" dirty="0" smtClean="0"/>
-              <a:t>ônibus;</a:t>
-            </a:r>
-          </a:p>
-          <a:p>
-            <a:r>
-              <a:rPr lang="en-US" dirty="0" err="1" smtClean="0"/>
-              <a:t>Obter</a:t>
-            </a:r>
-            <a:r>
-              <a:rPr lang="en-US" dirty="0" smtClean="0"/>
-              <a:t> </a:t>
-            </a:r>
-            <a:r>
-              <a:rPr lang="en-US" dirty="0" err="1"/>
-              <a:t>informações</a:t>
-            </a:r>
-            <a:r>
-              <a:rPr lang="en-US" dirty="0"/>
-              <a:t> </a:t>
-            </a:r>
-            <a:r>
-              <a:rPr lang="en-US" dirty="0" err="1"/>
-              <a:t>em</a:t>
-            </a:r>
-            <a:r>
-              <a:rPr lang="en-US" dirty="0"/>
-              <a:t> tempo real das </a:t>
-            </a:r>
-            <a:r>
-              <a:rPr lang="en-US" dirty="0" err="1"/>
-              <a:t>rotas</a:t>
-            </a:r>
-            <a:r>
-              <a:rPr lang="en-US" dirty="0"/>
-              <a:t> dos </a:t>
-            </a:r>
-            <a:r>
-              <a:rPr lang="en-US" dirty="0" err="1"/>
-              <a:t>ô</a:t>
-            </a:r>
-            <a:r>
-              <a:rPr lang="en-US" dirty="0" err="1" smtClean="0"/>
-              <a:t>nibus</a:t>
-            </a:r>
-            <a:r>
-              <a:rPr lang="en-US" dirty="0" smtClean="0"/>
-              <a:t> </a:t>
-            </a:r>
-            <a:r>
-              <a:rPr lang="en-US" dirty="0" smtClean="0"/>
-              <a:t>e </a:t>
-            </a:r>
-            <a:r>
-              <a:rPr lang="en-US" dirty="0" err="1" smtClean="0"/>
-              <a:t>sua</a:t>
-            </a:r>
-            <a:r>
-              <a:rPr lang="en-US" dirty="0" smtClean="0"/>
-              <a:t> </a:t>
-            </a:r>
-            <a:r>
-              <a:rPr lang="en-US" dirty="0" err="1" smtClean="0"/>
-              <a:t>lotação</a:t>
-            </a:r>
-            <a:r>
-              <a:rPr lang="en-US" dirty="0" smtClean="0"/>
-              <a:t> </a:t>
-            </a:r>
-            <a:r>
-              <a:rPr lang="en-US" dirty="0"/>
-              <a:t>e </a:t>
-            </a:r>
-            <a:r>
-              <a:rPr lang="en-US" dirty="0" err="1"/>
-              <a:t>disponibilizarem</a:t>
-            </a:r>
-            <a:r>
-              <a:rPr lang="en-US" dirty="0"/>
-              <a:t> </a:t>
-            </a:r>
-            <a:r>
-              <a:rPr lang="en-US" dirty="0" err="1"/>
-              <a:t>aos</a:t>
-            </a:r>
-            <a:r>
-              <a:rPr lang="en-US" dirty="0"/>
-              <a:t> </a:t>
-            </a:r>
-            <a:r>
-              <a:rPr lang="en-US" dirty="0" err="1"/>
-              <a:t>usúarios</a:t>
-            </a:r>
-            <a:r>
-              <a:rPr lang="en-US" dirty="0"/>
-              <a:t>, </a:t>
-            </a:r>
-            <a:r>
-              <a:rPr lang="en-US" dirty="0" err="1" smtClean="0"/>
-              <a:t>visando</a:t>
-            </a:r>
-            <a:r>
-              <a:rPr lang="en-US" dirty="0" smtClean="0"/>
-              <a:t> o </a:t>
-            </a:r>
-            <a:r>
-              <a:rPr lang="en-US" dirty="0" err="1" smtClean="0"/>
-              <a:t>equilibrio</a:t>
-            </a:r>
-            <a:r>
-              <a:rPr lang="en-US" dirty="0" smtClean="0"/>
-              <a:t> e </a:t>
-            </a:r>
-            <a:r>
-              <a:rPr lang="en-US" dirty="0" err="1" smtClean="0"/>
-              <a:t>conforto</a:t>
-            </a:r>
-            <a:r>
-              <a:rPr lang="en-US" dirty="0" smtClean="0"/>
-              <a:t>;</a:t>
-            </a:r>
-          </a:p>
-          <a:p>
-            <a:endParaRPr lang="en-US" dirty="0" smtClean="0"/>
-          </a:p>
-          <a:p>
-            <a:endParaRPr lang="en-US" dirty="0" smtClean="0"/>
-          </a:p>
-          <a:p>
-            <a:endParaRPr lang="en-US" dirty="0"/>
-          </a:p>
-          <a:p>
-            <a:pPr>
-              <a:buFontTx/>
-              <a:buChar char="-"/>
-            </a:pPr>
-            <a:endParaRPr lang="en-US" dirty="0"/>
-          </a:p>
-        </p:txBody>
-      </p:sp>
-    </p:spTree>
-    <p:extLst>
-      <p:ext uri="{BB962C8B-B14F-4D97-AF65-F5344CB8AC3E}">
-        <p14:creationId xmlns:p14="http://schemas.microsoft.com/office/powerpoint/2010/main" val="4255313497"/>
-      </p:ext>
-    </p:extLst>
-  </p:cSld>
-  <p:clrMapOvr>
-    <a:masterClrMapping/>
-  </p:clrMapOvr>
-  <p:timing>
-    <p:tnLst>
-      <p:par>
-        <p:cTn id="1" dur="indefinite" restart="never" nodeType="tmRoot"/>
-      </p:par>
-    </p:tnLst>
-  </p:timing>
-</p:sld>
-</file>
-
-<file path=ppt/slides/slide3.xml><?xml version="1.0" encoding="utf-8"?>
 <p:sld xmlns:a="http://schemas.openxmlformats.org/drawingml/2006/main" xmlns:r="http://schemas.openxmlformats.org/officeDocument/2006/relationships" xmlns:p="http://schemas.openxmlformats.org/presentationml/2006/main">
   <p:cSld>
     <p:bg>
@@ -7193,7 +6862,7 @@
 </p:sld>
 </file>
 
-<file path=ppt/slides/slide4.xml><?xml version="1.0" encoding="utf-8"?>
+<file path=ppt/slides/slide3.xml><?xml version="1.0" encoding="utf-8"?>
 <p:sld xmlns:a="http://schemas.openxmlformats.org/drawingml/2006/main" xmlns:r="http://schemas.openxmlformats.org/officeDocument/2006/relationships" xmlns:p="http://schemas.openxmlformats.org/presentationml/2006/main">
   <p:cSld>
     <p:bg>
@@ -7364,7 +7033,7 @@
         </p:nvSpPr>
         <p:spPr>
           <a:xfrm>
-            <a:off x="1358537" y="1319349"/>
+            <a:off x="850537" y="2055949"/>
             <a:ext cx="10646228" cy="1933302"/>
           </a:xfrm>
         </p:spPr>
@@ -7374,6 +7043,7 @@
           </a:bodyPr>
           <a:lstStyle/>
           <a:p>
+            <a:pPr algn="just"/>
             <a:r>
               <a:rPr lang="en-US" dirty="0"/>
               <a:t>Segundo o portal G1 Paraná, </a:t>
@@ -7845,7 +7515,7 @@
 </p:sld>
 </file>
 
-<file path=ppt/slides/slide5.xml><?xml version="1.0" encoding="utf-8"?>
+<file path=ppt/slides/slide4.xml><?xml version="1.0" encoding="utf-8"?>
 <p:sld xmlns:a="http://schemas.openxmlformats.org/drawingml/2006/main" xmlns:r="http://schemas.openxmlformats.org/officeDocument/2006/relationships" xmlns:p="http://schemas.openxmlformats.org/presentationml/2006/main">
   <p:cSld>
     <p:bg>
@@ -7948,6 +7618,321 @@
   </p:cSld>
   <p:clrMapOvr>
     <a:overrideClrMapping bg1="lt1" tx1="dk1" bg2="lt2" tx2="dk2" accent1="accent1" accent2="accent2" accent3="accent3" accent4="accent4" accent5="accent5" accent6="accent6" hlink="hlink" folHlink="folHlink"/>
+  </p:clrMapOvr>
+  <p:timing>
+    <p:tnLst>
+      <p:par>
+        <p:cTn id="1" dur="indefinite" restart="never" nodeType="tmRoot"/>
+      </p:par>
+    </p:tnLst>
+  </p:timing>
+</p:sld>
+</file>
+
+<file path=ppt/slides/slide5.xml><?xml version="1.0" encoding="utf-8"?>
+<p:sld xmlns:a="http://schemas.openxmlformats.org/drawingml/2006/main" xmlns:r="http://schemas.openxmlformats.org/officeDocument/2006/relationships" xmlns:p="http://schemas.openxmlformats.org/presentationml/2006/main">
+  <p:cSld>
+    <p:spTree>
+      <p:nvGrpSpPr>
+        <p:cNvPr id="1" name=""/>
+        <p:cNvGrpSpPr/>
+        <p:nvPr/>
+      </p:nvGrpSpPr>
+      <p:grpSpPr>
+        <a:xfrm>
+          <a:off x="0" y="0"/>
+          <a:ext cx="0" cy="0"/>
+          <a:chOff x="0" y="0"/>
+          <a:chExt cx="0" cy="0"/>
+        </a:xfrm>
+      </p:grpSpPr>
+      <p:sp>
+        <p:nvSpPr>
+          <p:cNvPr id="2" name="Title 1">
+            <a:extLst>
+              <a:ext uri="{FF2B5EF4-FFF2-40B4-BE49-F238E27FC236}">
+                <a16:creationId xmlns:a16="http://schemas.microsoft.com/office/drawing/2014/main" id="{C6639D46-D84D-43E0-AA12-676C351F67E9}"/>
+              </a:ext>
+            </a:extLst>
+          </p:cNvPr>
+          <p:cNvSpPr>
+            <a:spLocks noGrp="1"/>
+          </p:cNvSpPr>
+          <p:nvPr>
+            <p:ph type="title"/>
+          </p:nvPr>
+        </p:nvSpPr>
+        <p:spPr/>
+        <p:txBody>
+          <a:bodyPr>
+            <a:normAutofit/>
+          </a:bodyPr>
+          <a:lstStyle/>
+          <a:p>
+            <a:r>
+              <a:rPr lang="pt-BR" sz="5400" b="1" dirty="0" err="1">
+                <a:effectLst>
+                  <a:outerShdw blurRad="38100" dist="38100" dir="2700000" algn="tl">
+                    <a:srgbClr val="000000">
+                      <a:alpha val="43137"/>
+                    </a:srgbClr>
+                  </a:outerShdw>
+                </a:effectLst>
+              </a:rPr>
+              <a:t>Control</a:t>
+            </a:r>
+            <a:r>
+              <a:rPr lang="pt-BR" sz="5400" b="1" dirty="0">
+                <a:effectLst>
+                  <a:outerShdw blurRad="38100" dist="38100" dir="2700000" algn="tl">
+                    <a:srgbClr val="000000">
+                      <a:alpha val="43137"/>
+                    </a:srgbClr>
+                  </a:outerShdw>
+                </a:effectLst>
+              </a:rPr>
+              <a:t> bus</a:t>
+            </a:r>
+            <a:endParaRPr lang="en-US" sz="5400" b="1" dirty="0">
+              <a:effectLst>
+                <a:outerShdw blurRad="38100" dist="38100" dir="2700000" algn="tl">
+                  <a:srgbClr val="000000">
+                    <a:alpha val="43137"/>
+                  </a:srgbClr>
+                </a:outerShdw>
+              </a:effectLst>
+            </a:endParaRPr>
+          </a:p>
+        </p:txBody>
+      </p:sp>
+      <p:sp>
+        <p:nvSpPr>
+          <p:cNvPr id="3" name="Content Placeholder 2">
+            <a:extLst>
+              <a:ext uri="{FF2B5EF4-FFF2-40B4-BE49-F238E27FC236}">
+                <a16:creationId xmlns:a16="http://schemas.microsoft.com/office/drawing/2014/main" id="{A6BA5222-70D2-405F-8531-1FFB3B11AF99}"/>
+              </a:ext>
+            </a:extLst>
+          </p:cNvPr>
+          <p:cNvSpPr>
+            <a:spLocks noGrp="1"/>
+          </p:cNvSpPr>
+          <p:nvPr>
+            <p:ph idx="1"/>
+          </p:nvPr>
+        </p:nvSpPr>
+        <p:spPr/>
+        <p:txBody>
+          <a:bodyPr/>
+          <a:lstStyle/>
+          <a:p>
+            <a:pPr marL="0" indent="0">
+              <a:buNone/>
+            </a:pPr>
+            <a:r>
+              <a:rPr lang="pt-BR" dirty="0"/>
+              <a:t>	Control Bus é um projeto que tem como objetivo trazer aos gestores do sistema de transposte público (SPTrans) e às empresas que prestam serviços de transporte coletivo, </a:t>
+            </a:r>
+            <a:r>
+              <a:rPr lang="pt-BR" dirty="0" smtClean="0"/>
+              <a:t>as </a:t>
+            </a:r>
+            <a:r>
+              <a:rPr lang="pt-BR" dirty="0"/>
+              <a:t>seguintes soluções</a:t>
+            </a:r>
+            <a:r>
+              <a:rPr lang="pt-BR" dirty="0" smtClean="0"/>
+              <a:t>:</a:t>
+            </a:r>
+          </a:p>
+          <a:p>
+            <a:pPr marL="0" indent="0">
+              <a:buNone/>
+            </a:pPr>
+            <a:endParaRPr lang="pt-BR" dirty="0"/>
+          </a:p>
+          <a:p>
+            <a:r>
+              <a:rPr lang="pt-BR" dirty="0" smtClean="0"/>
+              <a:t>Entender </a:t>
+            </a:r>
+            <a:r>
+              <a:rPr lang="pt-BR" dirty="0"/>
+              <a:t>sua real demanda em cada uma das linhas de </a:t>
+            </a:r>
+            <a:r>
+              <a:rPr lang="pt-BR" dirty="0" smtClean="0"/>
+              <a:t>ônibus oferecidas</a:t>
+            </a:r>
+            <a:r>
+              <a:rPr lang="pt-BR" dirty="0"/>
+              <a:t>;</a:t>
+            </a:r>
+          </a:p>
+          <a:p>
+            <a:r>
+              <a:rPr lang="pt-BR" dirty="0" smtClean="0"/>
+              <a:t>Contabilizar </a:t>
+            </a:r>
+            <a:r>
+              <a:rPr lang="pt-BR" dirty="0"/>
+              <a:t>de maneira automatizada o fluxo de passageiros, seja na entrada ou saída, </a:t>
+            </a:r>
+            <a:r>
+              <a:rPr lang="pt-BR" dirty="0" smtClean="0"/>
+              <a:t>e entender o comportamento dos usuários no </a:t>
+            </a:r>
+            <a:r>
+              <a:rPr lang="pt-BR" dirty="0"/>
+              <a:t>decorrer dos intinerarios dos </a:t>
+            </a:r>
+            <a:r>
+              <a:rPr lang="pt-BR" dirty="0" smtClean="0"/>
+              <a:t>ônibus;</a:t>
+            </a:r>
+          </a:p>
+          <a:p>
+            <a:r>
+              <a:rPr lang="en-US" dirty="0" err="1" smtClean="0"/>
+              <a:t>Obter</a:t>
+            </a:r>
+            <a:r>
+              <a:rPr lang="en-US" dirty="0" smtClean="0"/>
+              <a:t> </a:t>
+            </a:r>
+            <a:r>
+              <a:rPr lang="en-US" dirty="0" err="1"/>
+              <a:t>informações</a:t>
+            </a:r>
+            <a:r>
+              <a:rPr lang="en-US" dirty="0"/>
+              <a:t> </a:t>
+            </a:r>
+            <a:r>
+              <a:rPr lang="en-US" dirty="0" err="1"/>
+              <a:t>em</a:t>
+            </a:r>
+            <a:r>
+              <a:rPr lang="en-US" dirty="0"/>
+              <a:t> tempo real das </a:t>
+            </a:r>
+            <a:r>
+              <a:rPr lang="en-US" dirty="0" err="1"/>
+              <a:t>rotas</a:t>
+            </a:r>
+            <a:r>
+              <a:rPr lang="en-US" dirty="0"/>
+              <a:t> dos </a:t>
+            </a:r>
+            <a:r>
+              <a:rPr lang="en-US" dirty="0" err="1"/>
+              <a:t>ô</a:t>
+            </a:r>
+            <a:r>
+              <a:rPr lang="en-US" dirty="0" err="1" smtClean="0"/>
+              <a:t>nibus</a:t>
+            </a:r>
+            <a:r>
+              <a:rPr lang="en-US" dirty="0" smtClean="0"/>
+              <a:t> e </a:t>
+            </a:r>
+            <a:r>
+              <a:rPr lang="en-US" dirty="0" err="1" smtClean="0"/>
+              <a:t>sua</a:t>
+            </a:r>
+            <a:r>
+              <a:rPr lang="en-US" dirty="0" smtClean="0"/>
+              <a:t> </a:t>
+            </a:r>
+            <a:r>
+              <a:rPr lang="en-US" dirty="0" err="1" smtClean="0"/>
+              <a:t>lotação</a:t>
+            </a:r>
+            <a:r>
+              <a:rPr lang="en-US" dirty="0" smtClean="0"/>
+              <a:t> </a:t>
+            </a:r>
+            <a:r>
+              <a:rPr lang="en-US" dirty="0"/>
+              <a:t>e </a:t>
+            </a:r>
+            <a:r>
+              <a:rPr lang="en-US" dirty="0" err="1"/>
+              <a:t>disponibilizarem</a:t>
+            </a:r>
+            <a:r>
+              <a:rPr lang="en-US" dirty="0"/>
+              <a:t> </a:t>
+            </a:r>
+            <a:r>
+              <a:rPr lang="en-US" dirty="0" err="1"/>
+              <a:t>aos</a:t>
+            </a:r>
+            <a:r>
+              <a:rPr lang="en-US" dirty="0"/>
+              <a:t> </a:t>
+            </a:r>
+            <a:r>
+              <a:rPr lang="en-US" dirty="0" err="1"/>
+              <a:t>usúarios</a:t>
+            </a:r>
+            <a:r>
+              <a:rPr lang="en-US" dirty="0"/>
+              <a:t>, </a:t>
+            </a:r>
+            <a:r>
+              <a:rPr lang="en-US" dirty="0" err="1" smtClean="0"/>
+              <a:t>visando</a:t>
+            </a:r>
+            <a:r>
+              <a:rPr lang="en-US" dirty="0" smtClean="0"/>
+              <a:t> o </a:t>
+            </a:r>
+            <a:r>
+              <a:rPr lang="en-US" dirty="0" err="1" smtClean="0"/>
+              <a:t>equilibrio</a:t>
+            </a:r>
+            <a:r>
+              <a:rPr lang="en-US" dirty="0" smtClean="0"/>
+              <a:t> e </a:t>
+            </a:r>
+            <a:r>
+              <a:rPr lang="en-US" dirty="0" err="1" smtClean="0"/>
+              <a:t>conforto</a:t>
+            </a:r>
+            <a:r>
+              <a:rPr lang="en-US" dirty="0" smtClean="0"/>
+              <a:t>;</a:t>
+            </a:r>
+          </a:p>
+          <a:p>
+            <a:endParaRPr lang="en-US" dirty="0" smtClean="0"/>
+          </a:p>
+          <a:p>
+            <a:endParaRPr lang="en-US" dirty="0" smtClean="0"/>
+          </a:p>
+          <a:p>
+            <a:endParaRPr lang="en-US" dirty="0"/>
+          </a:p>
+          <a:p>
+            <a:pPr>
+              <a:buFontTx/>
+              <a:buChar char="-"/>
+            </a:pPr>
+            <a:endParaRPr lang="en-US" dirty="0"/>
+          </a:p>
+        </p:txBody>
+      </p:sp>
+    </p:spTree>
+    <p:extLst>
+      <p:ext uri="{BB962C8B-B14F-4D97-AF65-F5344CB8AC3E}">
+        <p14:creationId xmlns:p14="http://schemas.microsoft.com/office/powerpoint/2010/main" val="4255313497"/>
+      </p:ext>
+    </p:extLst>
+  </p:cSld>
+  <p:clrMapOvr>
+    <a:masterClrMapping/>
   </p:clrMapOvr>
   <p:timing>
     <p:tnLst>

</xml_diff>